<commit_message>
working on lit review for entry exit, added new main text figure to show twl_1 dropouts
</commit_message>
<xml_diff>
--- a/Analysis/Metiers/writing/Fig_draft.pptx
+++ b/Analysis/Metiers/writing/Fig_draft.pptx
@@ -5,7 +5,7 @@
     <p:sldMasterId id="2147483648" r:id="rId1"/>
   </p:sldMasterIdLst>
   <p:notesMasterIdLst>
-    <p:notesMasterId r:id="rId9"/>
+    <p:notesMasterId r:id="rId10"/>
   </p:notesMasterIdLst>
   <p:sldIdLst>
     <p:sldId id="262" r:id="rId2"/>
@@ -14,7 +14,8 @@
     <p:sldId id="256" r:id="rId5"/>
     <p:sldId id="257" r:id="rId6"/>
     <p:sldId id="258" r:id="rId7"/>
-    <p:sldId id="259" r:id="rId8"/>
+    <p:sldId id="264" r:id="rId8"/>
+    <p:sldId id="259" r:id="rId9"/>
   </p:sldIdLst>
   <p:sldSz cx="9144000" cy="6858000" type="screen4x3"/>
   <p:notesSz cx="6858000" cy="9144000"/>
@@ -220,7 +221,7 @@
           <a:p>
             <a:fld id="{D7A406F5-1229-7E42-AAB0-C8FD823B5785}" type="datetimeFigureOut">
               <a:rPr lang="en-US" smtClean="0"/>
-              <a:t>10/23/15</a:t>
+              <a:t>11/17/15</a:t>
             </a:fld>
             <a:endParaRPr lang="en-US"/>
           </a:p>
@@ -1051,6 +1052,118 @@
           <a:p>
             <a:r>
               <a:rPr lang="en-US" dirty="0" smtClean="0"/>
+              <a:t>Proposed figure:</a:t>
+            </a:r>
+            <a:r>
+              <a:rPr lang="en-US" baseline="0" dirty="0" smtClean="0"/>
+              <a:t> Here we should how vessels fishing in limited entry groundfish responded after ITQ implementation. Here the width of the connections are proportional to the number of vessels at each decision point. We find that a majority of vessels continued fishing in limited entry groundfish and maintained their fishing portfolio. About a third of vessels previously fishing groundfish left the fishery with ITQ implementation, and </a:t>
+            </a:r>
+            <a:r>
+              <a:rPr lang="en-US" baseline="0" dirty="0" err="1" smtClean="0"/>
+              <a:t>adapation</a:t>
+            </a:r>
+            <a:r>
+              <a:rPr lang="en-US" baseline="0" dirty="0" smtClean="0"/>
+              <a:t> strategies are more diverse. Vessels were evenly split among living the fishery entirely, </a:t>
+            </a:r>
+            <a:r>
+              <a:rPr lang="en-US" baseline="0" dirty="0" err="1" smtClean="0"/>
+              <a:t>maintaing</a:t>
+            </a:r>
+            <a:r>
+              <a:rPr lang="en-US" baseline="0" dirty="0" smtClean="0"/>
+              <a:t> their original fishing portfolio (excepting groundfish trawl) and changing their portfolio. Those that did change their portfolio </a:t>
+            </a:r>
+            <a:r>
+              <a:rPr lang="en-US" baseline="0" smtClean="0"/>
+              <a:t>tended to compensate by adding fisheries. </a:t>
+            </a:r>
+            <a:endParaRPr lang="en-US" dirty="0"/>
+          </a:p>
+        </p:txBody>
+      </p:sp>
+      <p:sp>
+        <p:nvSpPr>
+          <p:cNvPr id="4" name="Slide Number Placeholder 3"/>
+          <p:cNvSpPr>
+            <a:spLocks noGrp="1"/>
+          </p:cNvSpPr>
+          <p:nvPr>
+            <p:ph type="sldNum" sz="quarter" idx="10"/>
+          </p:nvPr>
+        </p:nvSpPr>
+        <p:spPr/>
+        <p:txBody>
+          <a:bodyPr/>
+          <a:lstStyle/>
+          <a:p>
+            <a:fld id="{721C07D2-9A9A-1C45-A7D2-4FC295A17165}" type="slidenum">
+              <a:rPr lang="en-US" smtClean="0"/>
+              <a:t>7</a:t>
+            </a:fld>
+            <a:endParaRPr lang="en-US"/>
+          </a:p>
+        </p:txBody>
+      </p:sp>
+    </p:spTree>
+    <p:extLst>
+      <p:ext uri="{BB962C8B-B14F-4D97-AF65-F5344CB8AC3E}">
+        <p14:creationId xmlns:p14="http://schemas.microsoft.com/office/powerpoint/2010/main" val="1465138298"/>
+      </p:ext>
+    </p:extLst>
+  </p:cSld>
+  <p:clrMapOvr>
+    <a:masterClrMapping/>
+  </p:clrMapOvr>
+</p:notes>
+</file>
+
+<file path=ppt/notesSlides/notesSlide7.xml><?xml version="1.0" encoding="utf-8"?>
+<p:notes xmlns:a="http://schemas.openxmlformats.org/drawingml/2006/main" xmlns:r="http://schemas.openxmlformats.org/officeDocument/2006/relationships" xmlns:p="http://schemas.openxmlformats.org/presentationml/2006/main">
+  <p:cSld>
+    <p:spTree>
+      <p:nvGrpSpPr>
+        <p:cNvPr id="1" name=""/>
+        <p:cNvGrpSpPr/>
+        <p:nvPr/>
+      </p:nvGrpSpPr>
+      <p:grpSpPr>
+        <a:xfrm>
+          <a:off x="0" y="0"/>
+          <a:ext cx="0" cy="0"/>
+          <a:chOff x="0" y="0"/>
+          <a:chExt cx="0" cy="0"/>
+        </a:xfrm>
+      </p:grpSpPr>
+      <p:sp>
+        <p:nvSpPr>
+          <p:cNvPr id="2" name="Slide Image Placeholder 1"/>
+          <p:cNvSpPr>
+            <a:spLocks noGrp="1" noRot="1" noChangeAspect="1"/>
+          </p:cNvSpPr>
+          <p:nvPr>
+            <p:ph type="sldImg"/>
+          </p:nvPr>
+        </p:nvSpPr>
+        <p:spPr/>
+      </p:sp>
+      <p:sp>
+        <p:nvSpPr>
+          <p:cNvPr id="3" name="Notes Placeholder 2"/>
+          <p:cNvSpPr>
+            <a:spLocks noGrp="1"/>
+          </p:cNvSpPr>
+          <p:nvPr>
+            <p:ph type="body" idx="1"/>
+          </p:nvPr>
+        </p:nvSpPr>
+        <p:spPr/>
+        <p:txBody>
+          <a:bodyPr/>
+          <a:lstStyle/>
+          <a:p>
+            <a:r>
+              <a:rPr lang="en-US" dirty="0" smtClean="0"/>
               <a:t>Figure</a:t>
             </a:r>
             <a:r>
@@ -1078,7 +1191,7 @@
           <a:p>
             <a:fld id="{F9EA1FD9-7953-5545-A73D-9D4D73865256}" type="slidenum">
               <a:rPr lang="en-US" smtClean="0"/>
-              <a:t>7</a:t>
+              <a:t>8</a:t>
             </a:fld>
             <a:endParaRPr lang="en-US"/>
           </a:p>
@@ -1278,7 +1391,7 @@
           <a:p>
             <a:fld id="{605B20CD-5B9C-DF41-998D-995AAF9BFC1C}" type="datetimeFigureOut">
               <a:rPr lang="en-US" smtClean="0"/>
-              <a:t>10/23/15</a:t>
+              <a:t>11/17/15</a:t>
             </a:fld>
             <a:endParaRPr lang="en-US"/>
           </a:p>
@@ -1448,7 +1561,7 @@
           <a:p>
             <a:fld id="{605B20CD-5B9C-DF41-998D-995AAF9BFC1C}" type="datetimeFigureOut">
               <a:rPr lang="en-US" smtClean="0"/>
-              <a:t>10/23/15</a:t>
+              <a:t>11/17/15</a:t>
             </a:fld>
             <a:endParaRPr lang="en-US"/>
           </a:p>
@@ -1628,7 +1741,7 @@
           <a:p>
             <a:fld id="{605B20CD-5B9C-DF41-998D-995AAF9BFC1C}" type="datetimeFigureOut">
               <a:rPr lang="en-US" smtClean="0"/>
-              <a:t>10/23/15</a:t>
+              <a:t>11/17/15</a:t>
             </a:fld>
             <a:endParaRPr lang="en-US"/>
           </a:p>
@@ -1798,7 +1911,7 @@
           <a:p>
             <a:fld id="{605B20CD-5B9C-DF41-998D-995AAF9BFC1C}" type="datetimeFigureOut">
               <a:rPr lang="en-US" smtClean="0"/>
-              <a:t>10/23/15</a:t>
+              <a:t>11/17/15</a:t>
             </a:fld>
             <a:endParaRPr lang="en-US"/>
           </a:p>
@@ -2044,7 +2157,7 @@
           <a:p>
             <a:fld id="{605B20CD-5B9C-DF41-998D-995AAF9BFC1C}" type="datetimeFigureOut">
               <a:rPr lang="en-US" smtClean="0"/>
-              <a:t>10/23/15</a:t>
+              <a:t>11/17/15</a:t>
             </a:fld>
             <a:endParaRPr lang="en-US"/>
           </a:p>
@@ -2332,7 +2445,7 @@
           <a:p>
             <a:fld id="{605B20CD-5B9C-DF41-998D-995AAF9BFC1C}" type="datetimeFigureOut">
               <a:rPr lang="en-US" smtClean="0"/>
-              <a:t>10/23/15</a:t>
+              <a:t>11/17/15</a:t>
             </a:fld>
             <a:endParaRPr lang="en-US"/>
           </a:p>
@@ -2754,7 +2867,7 @@
           <a:p>
             <a:fld id="{605B20CD-5B9C-DF41-998D-995AAF9BFC1C}" type="datetimeFigureOut">
               <a:rPr lang="en-US" smtClean="0"/>
-              <a:t>10/23/15</a:t>
+              <a:t>11/17/15</a:t>
             </a:fld>
             <a:endParaRPr lang="en-US"/>
           </a:p>
@@ -2872,7 +2985,7 @@
           <a:p>
             <a:fld id="{605B20CD-5B9C-DF41-998D-995AAF9BFC1C}" type="datetimeFigureOut">
               <a:rPr lang="en-US" smtClean="0"/>
-              <a:t>10/23/15</a:t>
+              <a:t>11/17/15</a:t>
             </a:fld>
             <a:endParaRPr lang="en-US"/>
           </a:p>
@@ -2967,7 +3080,7 @@
           <a:p>
             <a:fld id="{605B20CD-5B9C-DF41-998D-995AAF9BFC1C}" type="datetimeFigureOut">
               <a:rPr lang="en-US" smtClean="0"/>
-              <a:t>10/23/15</a:t>
+              <a:t>11/17/15</a:t>
             </a:fld>
             <a:endParaRPr lang="en-US"/>
           </a:p>
@@ -3244,7 +3357,7 @@
           <a:p>
             <a:fld id="{605B20CD-5B9C-DF41-998D-995AAF9BFC1C}" type="datetimeFigureOut">
               <a:rPr lang="en-US" smtClean="0"/>
-              <a:t>10/23/15</a:t>
+              <a:t>11/17/15</a:t>
             </a:fld>
             <a:endParaRPr lang="en-US"/>
           </a:p>
@@ -3497,7 +3610,7 @@
           <a:p>
             <a:fld id="{605B20CD-5B9C-DF41-998D-995AAF9BFC1C}" type="datetimeFigureOut">
               <a:rPr lang="en-US" smtClean="0"/>
-              <a:t>10/23/15</a:t>
+              <a:t>11/17/15</a:t>
             </a:fld>
             <a:endParaRPr lang="en-US"/>
           </a:p>
@@ -3710,7 +3823,7 @@
           <a:p>
             <a:fld id="{605B20CD-5B9C-DF41-998D-995AAF9BFC1C}" type="datetimeFigureOut">
               <a:rPr lang="en-US" smtClean="0"/>
-              <a:t>10/23/15</a:t>
+              <a:t>11/17/15</a:t>
             </a:fld>
             <a:endParaRPr lang="en-US"/>
           </a:p>
@@ -4451,6 +4564,124 @@
 </file>
 
 <file path=ppt/slides/slide7.xml><?xml version="1.0" encoding="utf-8"?>
+<p:sld xmlns:a="http://schemas.openxmlformats.org/drawingml/2006/main" xmlns:r="http://schemas.openxmlformats.org/officeDocument/2006/relationships" xmlns:p="http://schemas.openxmlformats.org/presentationml/2006/main">
+  <p:cSld>
+    <p:spTree>
+      <p:nvGrpSpPr>
+        <p:cNvPr id="1" name=""/>
+        <p:cNvGrpSpPr/>
+        <p:nvPr/>
+      </p:nvGrpSpPr>
+      <p:grpSpPr>
+        <a:xfrm>
+          <a:off x="0" y="0"/>
+          <a:ext cx="0" cy="0"/>
+          <a:chOff x="0" y="0"/>
+          <a:chExt cx="0" cy="0"/>
+        </a:xfrm>
+      </p:grpSpPr>
+      <p:pic>
+        <p:nvPicPr>
+          <p:cNvPr id="9" name="Picture 8"/>
+          <p:cNvPicPr>
+            <a:picLocks noChangeAspect="1"/>
+          </p:cNvPicPr>
+          <p:nvPr/>
+        </p:nvPicPr>
+        <p:blipFill>
+          <a:blip r:embed="rId3"/>
+          <a:stretch>
+            <a:fillRect/>
+          </a:stretch>
+        </p:blipFill>
+        <p:spPr>
+          <a:xfrm>
+            <a:off x="557985" y="857250"/>
+            <a:ext cx="8028031" cy="5143500"/>
+          </a:xfrm>
+          <a:prstGeom prst="rect">
+            <a:avLst/>
+          </a:prstGeom>
+        </p:spPr>
+      </p:pic>
+      <p:cxnSp>
+        <p:nvCxnSpPr>
+          <p:cNvPr id="6" name="Straight Connector 5"/>
+          <p:cNvCxnSpPr/>
+          <p:nvPr/>
+        </p:nvCxnSpPr>
+        <p:spPr>
+          <a:xfrm>
+            <a:off x="2428875" y="985837"/>
+            <a:ext cx="0" cy="5014913"/>
+          </a:xfrm>
+          <a:prstGeom prst="line">
+            <a:avLst/>
+          </a:prstGeom>
+          <a:ln w="38100"/>
+        </p:spPr>
+        <p:style>
+          <a:lnRef idx="1">
+            <a:schemeClr val="accent2"/>
+          </a:lnRef>
+          <a:fillRef idx="0">
+            <a:schemeClr val="accent2"/>
+          </a:fillRef>
+          <a:effectRef idx="0">
+            <a:schemeClr val="accent2"/>
+          </a:effectRef>
+          <a:fontRef idx="minor">
+            <a:schemeClr val="tx1"/>
+          </a:fontRef>
+        </p:style>
+      </p:cxnSp>
+      <p:sp>
+        <p:nvSpPr>
+          <p:cNvPr id="8" name="TextBox 7"/>
+          <p:cNvSpPr txBox="1"/>
+          <p:nvPr/>
+        </p:nvSpPr>
+        <p:spPr>
+          <a:xfrm>
+            <a:off x="828675" y="5423670"/>
+            <a:ext cx="1600200" cy="600164"/>
+          </a:xfrm>
+          <a:prstGeom prst="rect">
+            <a:avLst/>
+          </a:prstGeom>
+          <a:noFill/>
+        </p:spPr>
+        <p:txBody>
+          <a:bodyPr wrap="square" rtlCol="0">
+            <a:spAutoFit/>
+          </a:bodyPr>
+          <a:lstStyle/>
+          <a:p>
+            <a:r>
+              <a:rPr lang="en-US" sz="1650" dirty="0">
+                <a:latin typeface="Helvetica Neue" charset="0"/>
+                <a:ea typeface="Helvetica Neue" charset="0"/>
+                <a:cs typeface="Helvetica Neue" charset="0"/>
+              </a:rPr>
+              <a:t>ITQs implemented</a:t>
+            </a:r>
+          </a:p>
+        </p:txBody>
+      </p:sp>
+    </p:spTree>
+    <p:extLst>
+      <p:ext uri="{BB962C8B-B14F-4D97-AF65-F5344CB8AC3E}">
+        <p14:creationId xmlns:p14="http://schemas.microsoft.com/office/powerpoint/2010/main" val="1811144068"/>
+      </p:ext>
+    </p:extLst>
+  </p:cSld>
+  <p:clrMapOvr>
+    <a:masterClrMapping/>
+  </p:clrMapOvr>
+</p:sld>
+</file>
+
+<file path=ppt/slides/slide8.xml><?xml version="1.0" encoding="utf-8"?>
 <p:sld xmlns:a="http://schemas.openxmlformats.org/drawingml/2006/main" xmlns:r="http://schemas.openxmlformats.org/officeDocument/2006/relationships" xmlns:p="http://schemas.openxmlformats.org/presentationml/2006/main">
   <p:cSld>
     <p:spTree>

</xml_diff>

<commit_message>
refining structure of paper, added new figure
</commit_message>
<xml_diff>
--- a/Analysis/Metiers/writing/Fig_draft.pptx
+++ b/Analysis/Metiers/writing/Fig_draft.pptx
@@ -1072,11 +1072,7 @@
             </a:r>
             <a:r>
               <a:rPr lang="en-US" baseline="0" dirty="0" smtClean="0"/>
-              <a:t> their original fishing portfolio (excepting groundfish trawl) and changing their portfolio. Those that did change their portfolio </a:t>
-            </a:r>
-            <a:r>
-              <a:rPr lang="en-US" baseline="0" smtClean="0"/>
-              <a:t>tended to compensate by adding fisheries. </a:t>
+              <a:t> their original fishing portfolio (excepting groundfish trawl) and changing their portfolio. Those that did change their portfolio tended to compensate by adding fisheries. </a:t>
             </a:r>
             <a:endParaRPr lang="en-US" dirty="0"/>
           </a:p>
@@ -4460,7 +4456,7 @@
       </p:grpSpPr>
       <p:pic>
         <p:nvPicPr>
-          <p:cNvPr id="4" name="Picture 3"/>
+          <p:cNvPr id="2" name="Picture 1"/>
           <p:cNvPicPr>
             <a:picLocks noChangeAspect="1"/>
           </p:cNvPicPr>
@@ -4474,8 +4470,8 @@
         </p:blipFill>
         <p:spPr>
           <a:xfrm>
-            <a:off x="0" y="97178"/>
-            <a:ext cx="9144000" cy="6663644"/>
+            <a:off x="0" y="379494"/>
+            <a:ext cx="9144000" cy="6099012"/>
           </a:xfrm>
           <a:prstGeom prst="rect">
             <a:avLst/>

</xml_diff>